<commit_message>
Introduction und abstract leicht geändert
</commit_message>
<xml_diff>
--- a/Poster.pptx
+++ b/Poster.pptx
@@ -450,7 +450,7 @@
                   <a:spcPts val="1223"/>
                 </a:lnSpc>
               </a:pPr>
-              <a:t>‹Nr.›</a:t>
+              <a:t>‹#›</a:t>
             </a:fld>
             <a:endParaRPr lang="de-DE" sz="900">
               <a:latin typeface="Arial"/>
@@ -681,7 +681,7 @@
                 </a:lnSpc>
                 <a:defRPr/>
               </a:pPr>
-              <a:t>05.10.2022</a:t>
+              <a:t>06.10.2022</a:t>
             </a:fld>
             <a:endParaRPr lang="de-DE" sz="900"/>
           </a:p>
@@ -1313,7 +1313,7 @@
                   <a:spcPts val="1223"/>
                 </a:lnSpc>
               </a:pPr>
-              <a:t>‹Nr.›</a:t>
+              <a:t>‹#›</a:t>
             </a:fld>
             <a:endParaRPr kumimoji="0" lang="de-DE" sz="900">
               <a:solidFill>
@@ -1547,7 +1547,7 @@
                 </a:lnSpc>
                 <a:defRPr/>
               </a:pPr>
-              <a:t>05.10.2022</a:t>
+              <a:t>06.10.2022</a:t>
             </a:fld>
             <a:endParaRPr lang="de-DE" sz="900"/>
           </a:p>
@@ -8058,7 +8058,7 @@
             <a:pPr algn="just"/>
             <a:r>
               <a:rPr lang="en-US" sz="3200" dirty="0"/>
-              <a:t>Abstract – Addressing the challenges associated with open electrical grid models to advance load flow simulations required for the transition toward a sustainable energy system. This paper presents a Python-based open electrical grid model generator by using OpenStreetMap data as the input to increase the availability of open-source models for regional transmission networks. The method is based on the existing open electrical grid tool </a:t>
+              <a:t>Abstract – This paper aims at the challenges associated with open electrical grid models to advance load flow simulations required for the transition toward a sustainable energy system. This paper presents a Python-based open electrical grid model generator by using OpenStreetMap data as the input to increase the availability of open-source models for regional transmission networks. The method is based on the existing open electrical grid tool </a:t>
             </a:r>
             <a:r>
               <a:rPr lang="en-US" sz="3200" dirty="0" err="1"/>
@@ -10279,7 +10279,7 @@
             <a:pPr algn="just"/>
             <a:r>
               <a:rPr lang="en-US" sz="3200" dirty="0"/>
-              <a:t>As decentralization of generation of electricity is going forward as sustainable energy is in focus more than ever, more electrical grid models are needed, e.g. to simulate power flow. Especially countries of the global south, like Africa, could gain much from this transition and models, which brings the need of public, open-source models being available. This project makes a step forward contributing to this issue by using OSM data and Python as a programming language to develop an existing open grid model for the German transmission network into an open tool for creating electrical grid models.</a:t>
+              <a:t>As decentralization of generation of electricity is going forward as sustainable energy is in focus more than ever, more electrical grid models are needed, e.g. to simulate power flow. Countries of the global south and especially Africa could gain much from this transition and models, which brings the need of public, open-source models being available. This project makes a step forward contributing to this issue by using OSM data and Python as a programming language to develop an existing open grid model for the German transmission network into an open tool for creating electrical grid models.</a:t>
             </a:r>
           </a:p>
           <a:p>

</xml_diff>

<commit_message>
Theory of the Filter
</commit_message>
<xml_diff>
--- a/Poster.pptx
+++ b/Poster.pptx
@@ -8979,7 +8979,7 @@
         <p:spPr>
           <a:xfrm>
             <a:off x="1085498" y="21004352"/>
-            <a:ext cx="9411166" cy="830997"/>
+            <a:ext cx="11775596" cy="830997"/>
           </a:xfrm>
           <a:prstGeom prst="rect">
             <a:avLst/>
@@ -8994,7 +8994,7 @@
           <a:p>
             <a:r>
               <a:rPr lang="en-US" sz="4800" b="1" dirty="0"/>
-              <a:t>2. Theory and Application of ….</a:t>
+              <a:t>2. Theory and Application of the Filter </a:t>
             </a:r>
             <a:endParaRPr lang="en-US" sz="4000" b="1" dirty="0"/>
           </a:p>
@@ -9009,7 +9009,7 @@
         <p:spPr>
           <a:xfrm>
             <a:off x="1151321" y="21972912"/>
-            <a:ext cx="13206660" cy="3046988"/>
+            <a:ext cx="13206660" cy="7417415"/>
           </a:xfrm>
           <a:prstGeom prst="rect">
             <a:avLst/>
@@ -9028,7 +9028,7 @@
             </a:pPr>
             <a:r>
               <a:rPr lang="en-US" sz="3400" dirty="0"/>
-              <a:t>Text</a:t>
+              <a:t>The OSM data includes all data of the selected region. Hence the data must be filtered to sort out unnecessary objects like streets and bus lines. For that three Iterations are used:</a:t>
             </a:r>
           </a:p>
           <a:p>
@@ -9038,23 +9038,50 @@
             </a:pPr>
             <a:r>
               <a:rPr lang="en-US" sz="3400" dirty="0"/>
-              <a:t>Text</a:t>
-            </a:r>
-          </a:p>
-          <a:p>
-            <a:pPr algn="just"/>
-            <a:endParaRPr lang="de-DE" sz="2800" b="1" i="1" dirty="0"/>
-          </a:p>
-          <a:p>
-            <a:pPr algn="just"/>
-            <a:r>
-              <a:rPr lang="de-DE" sz="2800" b="1" i="1" dirty="0"/>
-              <a:t>Formel……</a:t>
-            </a:r>
-            <a:endParaRPr lang="en-US" sz="2800" dirty="0"/>
-          </a:p>
-          <a:p>
-            <a:pPr algn="just"/>
+              <a:t>1. Objects of the class Relation with the value “power” for the tag “route” are saved as a Python tuple object.</a:t>
+            </a:r>
+          </a:p>
+          <a:p>
+            <a:pPr marL="457200" indent="-457200" algn="just">
+              <a:buFont typeface="Arial" panose="020B0604020202020204" pitchFamily="34" charset="0"/>
+              <a:buChar char="•"/>
+            </a:pPr>
+            <a:r>
+              <a:rPr lang="en-US" sz="3400" dirty="0"/>
+              <a:t>2. Objects of the class Ways with the tag “power” or if the Way object can be found in the before saved list of Relations. Also, all Nodes listed in this Way object are saved.</a:t>
+            </a:r>
+          </a:p>
+          <a:p>
+            <a:pPr marL="457200" indent="-457200" algn="just">
+              <a:buFont typeface="Arial" panose="020B0604020202020204" pitchFamily="34" charset="0"/>
+              <a:buChar char="•"/>
+            </a:pPr>
+            <a:r>
+              <a:rPr lang="en-US" sz="3400" dirty="0"/>
+              <a:t>3. Objects of the class Nodes are considered. </a:t>
+            </a:r>
+            <a:r>
+              <a:rPr lang="en-GB" sz="3400" dirty="0"/>
+              <a:t>Here, only the Nodes are needed, that are part of the Node tuple created in the second iteration. </a:t>
+            </a:r>
+          </a:p>
+          <a:p>
+            <a:pPr marL="457200" indent="-457200" algn="just">
+              <a:buFont typeface="Arial" panose="020B0604020202020204" pitchFamily="34" charset="0"/>
+              <a:buChar char="•"/>
+            </a:pPr>
+            <a:r>
+              <a:rPr lang="en-GB" sz="3400" dirty="0"/>
+              <a:t>These results are converted to a Panda’s </a:t>
+            </a:r>
+            <a:r>
+              <a:rPr lang="en-GB" sz="3400" dirty="0" err="1"/>
+              <a:t>DataFrame</a:t>
+            </a:r>
+            <a:r>
+              <a:rPr lang="en-GB" sz="3400" dirty="0"/>
+              <a:t> and stored in a separate CSV-File for each Object.</a:t>
+            </a:r>
             <a:endParaRPr lang="en-US" sz="3400" dirty="0"/>
           </a:p>
           <a:p>
@@ -9102,7 +9129,7 @@
         <p:spPr>
           <a:xfrm>
             <a:off x="1151321" y="34591837"/>
-            <a:ext cx="9308574" cy="830997"/>
+            <a:ext cx="8953092" cy="830997"/>
           </a:xfrm>
           <a:prstGeom prst="rect">
             <a:avLst/>
@@ -9117,7 +9144,7 @@
           <a:p>
             <a:r>
               <a:rPr lang="en-US" sz="4800" b="1" dirty="0"/>
-              <a:t>3. Assumptions and Scenarios</a:t>
+              <a:t>3. Theory of the Python Script</a:t>
             </a:r>
             <a:endParaRPr lang="en-US" sz="4000" b="1" dirty="0"/>
           </a:p>
@@ -9469,14 +9496,14 @@
           <p:nvPr>
             <p:extLst>
               <p:ext uri="{D42A27DB-BD31-4B8C-83A1-F6EECF244321}">
-                <p14:modId xmlns:p14="http://schemas.microsoft.com/office/powerpoint/2010/main" val="994694975"/>
+                <p14:modId xmlns:p14="http://schemas.microsoft.com/office/powerpoint/2010/main" val="1764580940"/>
               </p:ext>
             </p:extLst>
           </p:nvPr>
         </p:nvGraphicFramePr>
         <p:xfrm>
-          <a:off x="1077115" y="26272775"/>
-          <a:ext cx="13352304" cy="6941537"/>
+          <a:off x="1034253" y="29205661"/>
+          <a:ext cx="13352304" cy="5486400"/>
         </p:xfrm>
         <a:graphic>
           <a:graphicData uri="http://schemas.openxmlformats.org/drawingml/2006/table">
@@ -9507,7 +9534,7 @@
                   </a:extLst>
                 </a:gridCol>
               </a:tblGrid>
-              <a:tr h="1183580">
+              <a:tr h="0">
                 <a:tc>
                   <a:txBody>
                     <a:bodyPr/>
@@ -9556,7 +9583,7 @@
                   </a:ext>
                 </a:extLst>
               </a:tr>
-              <a:tr h="639773">
+              <a:tr h="0">
                 <a:tc>
                   <a:txBody>
                     <a:bodyPr/>
@@ -9647,7 +9674,7 @@
                   </a:ext>
                 </a:extLst>
               </a:tr>
-              <a:tr h="639773">
+              <a:tr h="0">
                 <a:tc>
                   <a:txBody>
                     <a:bodyPr/>
@@ -9696,7 +9723,7 @@
                   </a:ext>
                 </a:extLst>
               </a:tr>
-              <a:tr h="639773">
+              <a:tr h="0">
                 <a:tc>
                   <a:txBody>
                     <a:bodyPr/>
@@ -9750,7 +9777,7 @@
                   </a:ext>
                 </a:extLst>
               </a:tr>
-              <a:tr h="639773">
+              <a:tr h="0">
                 <a:tc>
                   <a:txBody>
                     <a:bodyPr/>
@@ -9799,7 +9826,7 @@
                   </a:ext>
                 </a:extLst>
               </a:tr>
-              <a:tr h="639773">
+              <a:tr h="0">
                 <a:tc>
                   <a:txBody>
                     <a:bodyPr/>
@@ -9848,7 +9875,7 @@
                   </a:ext>
                 </a:extLst>
               </a:tr>
-              <a:tr h="639773">
+              <a:tr h="0">
                 <a:tc>
                   <a:txBody>
                     <a:bodyPr/>
@@ -9899,7 +9926,7 @@
                   </a:ext>
                 </a:extLst>
               </a:tr>
-              <a:tr h="639773">
+              <a:tr h="0">
                 <a:tc>
                   <a:txBody>
                     <a:bodyPr/>
@@ -9948,7 +9975,7 @@
                   </a:ext>
                 </a:extLst>
               </a:tr>
-              <a:tr h="639773">
+              <a:tr h="0">
                 <a:tc>
                   <a:txBody>
                     <a:bodyPr/>
@@ -10001,7 +10028,7 @@
                   </a:ext>
                 </a:extLst>
               </a:tr>
-              <a:tr h="639773">
+              <a:tr h="0">
                 <a:tc>
                   <a:txBody>
                     <a:bodyPr/>

</xml_diff>

<commit_message>
1. OSM + adjustments
</commit_message>
<xml_diff>
--- a/Poster.pptx
+++ b/Poster.pptx
@@ -450,7 +450,7 @@
                   <a:spcPts val="1223"/>
                 </a:lnSpc>
               </a:pPr>
-              <a:t>‹#›</a:t>
+              <a:t>‹Nr.›</a:t>
             </a:fld>
             <a:endParaRPr lang="de-DE" sz="900">
               <a:latin typeface="Arial"/>
@@ -681,7 +681,7 @@
                 </a:lnSpc>
                 <a:defRPr/>
               </a:pPr>
-              <a:t>07.10.2022</a:t>
+              <a:t>09.10.2022</a:t>
             </a:fld>
             <a:endParaRPr lang="de-DE" sz="900"/>
           </a:p>
@@ -1313,7 +1313,7 @@
                   <a:spcPts val="1223"/>
                 </a:lnSpc>
               </a:pPr>
-              <a:t>‹#›</a:t>
+              <a:t>‹Nr.›</a:t>
             </a:fld>
             <a:endParaRPr kumimoji="0" lang="de-DE" sz="900">
               <a:solidFill>
@@ -1547,7 +1547,7 @@
                 </a:lnSpc>
                 <a:defRPr/>
               </a:pPr>
-              <a:t>07.10.2022</a:t>
+              <a:t>09.10.2022</a:t>
             </a:fld>
             <a:endParaRPr lang="de-DE" sz="900"/>
           </a:p>
@@ -8041,8 +8041,8 @@
         </p:nvSpPr>
         <p:spPr>
           <a:xfrm>
-            <a:off x="1078017" y="4686300"/>
-            <a:ext cx="28085931" cy="3539430"/>
+            <a:off x="1078017" y="4528828"/>
+            <a:ext cx="28085931" cy="4278094"/>
           </a:xfrm>
           <a:prstGeom prst="rect">
             <a:avLst/>
@@ -8057,17 +8057,22 @@
           <a:p>
             <a:pPr algn="just"/>
             <a:r>
-              <a:rPr lang="en-US" sz="3200" dirty="0"/>
-              <a:t>Abstract – This paper aims at the challenges associated with open electrical grid models to advance load flow simulations required for the transition toward a sustainable energy system. This paper presents a Python-based open electrical grid model generator by using OpenStreetMap data as the input to increase the availability of open-source models for regional transmission networks. The method is based on the existing open electrical grid tool </a:t>
-            </a:r>
-            <a:r>
-              <a:rPr lang="en-US" sz="3200" dirty="0" err="1"/>
+              <a:rPr lang="en-US" sz="3400" dirty="0"/>
+              <a:t>Abstract – This paper aims at addressing the challenges associated with open electrical grid models to advance load flow simulations required for the transition toward a sustainable energy system. This paper presents a Python-based open electrical grid model generator by using OpenStreetMap data as the input to increase the availability of open-source models for regional transmission networks. The method is based on the existing open electrical grid tool </a:t>
+            </a:r>
+            <a:r>
+              <a:rPr lang="en-US" sz="3400" dirty="0" err="1"/>
               <a:t>osmTGmod</a:t>
             </a:r>
             <a:r>
-              <a:rPr lang="en-US" sz="3200" dirty="0"/>
-              <a:t> and consists of two main steps presented in detail. First of all, a new state-of-the-art OpenStreetMap filter is researched and implemented. It converts Open Street Map data to CSV data categorized by the corresponding object classes. Following this, missing data is populated by a Python Script depending on different heuristics. The software and packages are presented and one example of a regional transmission network is described to provide insight into the method.</a:t>
-            </a:r>
+              <a:rPr lang="en-US" sz="3400" dirty="0"/>
+              <a:t> and consists of two main steps presented in detail. First of all, a new state-of-the-art OpenStreetMap filter is researched and implemented. It converts Open Street Map data to CSV data categorized by the corresponding object classes. Following this, missing data is populated by a Python Script depending on different heuristics. The software and packages are presented, and one example of a regional transmission network is described to provide insight into the method.</a:t>
+            </a:r>
+            <a:endParaRPr lang="de-DE" sz="3400" dirty="0"/>
+          </a:p>
+          <a:p>
+            <a:pPr algn="just"/>
+            <a:endParaRPr lang="en-US" sz="3400" dirty="0"/>
           </a:p>
         </p:txBody>
       </p:sp>
@@ -8079,7 +8084,7 @@
         </p:nvSpPr>
         <p:spPr>
           <a:xfrm>
-            <a:off x="15842681" y="15050356"/>
+            <a:off x="15948518" y="21963390"/>
             <a:ext cx="13338017" cy="830997"/>
           </a:xfrm>
           <a:prstGeom prst="rect">
@@ -8095,11 +8100,7 @@
           <a:p>
             <a:r>
               <a:rPr lang="en-US" sz="4800" b="1" dirty="0"/>
-              <a:t>1. </a:t>
-            </a:r>
-            <a:r>
-              <a:rPr lang="en-US" sz="4800" b="1" dirty="0" err="1"/>
-              <a:t>Tabelle</a:t>
+              <a:t>Table 1: Adapting tables of power objects </a:t>
             </a:r>
             <a:endParaRPr lang="en-US" sz="4000" b="1" dirty="0"/>
           </a:p>
@@ -8113,7 +8114,7 @@
         </p:nvCxnSpPr>
         <p:spPr>
           <a:xfrm flipV="1">
-            <a:off x="-63668" y="8261109"/>
+            <a:off x="1" y="8433953"/>
             <a:ext cx="14493087" cy="31159"/>
           </a:xfrm>
           <a:prstGeom prst="line">
@@ -8144,7 +8145,7 @@
         </p:nvCxnSpPr>
         <p:spPr>
           <a:xfrm>
-            <a:off x="15837008" y="22633465"/>
+            <a:off x="15543377" y="32395796"/>
             <a:ext cx="14468513" cy="0"/>
           </a:xfrm>
           <a:prstGeom prst="line">
@@ -8179,7 +8180,7 @@
         </p:nvCxnSpPr>
         <p:spPr>
           <a:xfrm>
-            <a:off x="-63668" y="21802468"/>
+            <a:off x="0" y="32926271"/>
             <a:ext cx="14396625" cy="0"/>
           </a:xfrm>
           <a:prstGeom prst="line">
@@ -8214,7 +8215,7 @@
         </p:nvSpPr>
         <p:spPr>
           <a:xfrm>
-            <a:off x="15746219" y="8254998"/>
+            <a:off x="15948518" y="15687451"/>
             <a:ext cx="13992149" cy="830997"/>
           </a:xfrm>
           <a:prstGeom prst="rect">
@@ -8244,7 +8245,7 @@
         </p:nvCxnSpPr>
         <p:spPr>
           <a:xfrm>
-            <a:off x="15842681" y="8261107"/>
+            <a:off x="15459215" y="15327049"/>
             <a:ext cx="14459520" cy="31161"/>
           </a:xfrm>
           <a:prstGeom prst="line">
@@ -8355,7 +8356,7 @@
         </p:nvSpPr>
         <p:spPr>
           <a:xfrm>
-            <a:off x="24667171" y="23014792"/>
+            <a:off x="24373540" y="32777123"/>
             <a:ext cx="5228627" cy="1969770"/>
           </a:xfrm>
           <a:prstGeom prst="rect">
@@ -8432,7 +8433,7 @@
         </p:nvCxnSpPr>
         <p:spPr>
           <a:xfrm>
-            <a:off x="217306" y="30525111"/>
+            <a:off x="15812545" y="9290658"/>
             <a:ext cx="14429419" cy="31857"/>
           </a:xfrm>
           <a:prstGeom prst="line">
@@ -8480,11 +8481,7 @@
             <a:pPr algn="just"/>
             <a:r>
               <a:rPr lang="en-US" sz="4800" b="1" dirty="0"/>
-              <a:t>4. </a:t>
-            </a:r>
-            <a:r>
-              <a:rPr lang="en-US" sz="4800" b="1"/>
-              <a:t>Conclusions</a:t>
+              <a:t>4. Conclusions</a:t>
             </a:r>
             <a:endParaRPr lang="en-US" sz="4000" b="1" dirty="0"/>
           </a:p>
@@ -8634,7 +8631,7 @@
         </p:nvGrpSpPr>
         <p:grpSpPr>
           <a:xfrm>
-            <a:off x="1" y="4302125"/>
+            <a:off x="1" y="4190158"/>
             <a:ext cx="30299354" cy="384175"/>
             <a:chOff x="903819" y="0"/>
             <a:chExt cx="8244000" cy="108000"/>
@@ -8978,7 +8975,7 @@
         </p:nvSpPr>
         <p:spPr>
           <a:xfrm>
-            <a:off x="1085498" y="21004352"/>
+            <a:off x="1310514" y="32052604"/>
             <a:ext cx="11775596" cy="830997"/>
           </a:xfrm>
           <a:prstGeom prst="rect">
@@ -9002,103 +8999,13 @@
       </p:sp>
       <p:sp>
         <p:nvSpPr>
-          <p:cNvPr id="123" name="Textfeld 122"/>
-          <p:cNvSpPr txBox="1"/>
-          <p:nvPr/>
-        </p:nvSpPr>
-        <p:spPr>
-          <a:xfrm>
-            <a:off x="1151321" y="21972912"/>
-            <a:ext cx="13206660" cy="7417415"/>
-          </a:xfrm>
-          <a:prstGeom prst="rect">
-            <a:avLst/>
-          </a:prstGeom>
-          <a:noFill/>
-        </p:spPr>
-        <p:txBody>
-          <a:bodyPr wrap="square" rtlCol="0">
-            <a:spAutoFit/>
-          </a:bodyPr>
-          <a:lstStyle/>
-          <a:p>
-            <a:pPr marL="457200" indent="-457200" algn="just">
-              <a:buFont typeface="Arial" panose="020B0604020202020204" pitchFamily="34" charset="0"/>
-              <a:buChar char="•"/>
-            </a:pPr>
-            <a:r>
-              <a:rPr lang="en-US" sz="3400" dirty="0"/>
-              <a:t>The OSM data includes all data of the selected region. Hence the data must be filtered to sort out unnecessary objects like streets and bus lines. For that three Iterations are used:</a:t>
-            </a:r>
-          </a:p>
-          <a:p>
-            <a:pPr marL="457200" indent="-457200" algn="just">
-              <a:buFont typeface="Arial" panose="020B0604020202020204" pitchFamily="34" charset="0"/>
-              <a:buChar char="•"/>
-            </a:pPr>
-            <a:r>
-              <a:rPr lang="en-US" sz="3400" dirty="0"/>
-              <a:t>1. Objects of the class Relation with the value “power” for the tag “route” are saved as a Python tuple object.</a:t>
-            </a:r>
-          </a:p>
-          <a:p>
-            <a:pPr marL="457200" indent="-457200" algn="just">
-              <a:buFont typeface="Arial" panose="020B0604020202020204" pitchFamily="34" charset="0"/>
-              <a:buChar char="•"/>
-            </a:pPr>
-            <a:r>
-              <a:rPr lang="en-US" sz="3400" dirty="0"/>
-              <a:t>2. Objects of the class Ways with the tag “power” or if the Way object can be found in the before saved list of Relations. Also, all Nodes listed in this Way object are saved.</a:t>
-            </a:r>
-          </a:p>
-          <a:p>
-            <a:pPr marL="457200" indent="-457200" algn="just">
-              <a:buFont typeface="Arial" panose="020B0604020202020204" pitchFamily="34" charset="0"/>
-              <a:buChar char="•"/>
-            </a:pPr>
-            <a:r>
-              <a:rPr lang="en-US" sz="3400" dirty="0"/>
-              <a:t>3. Objects of the class Nodes are considered. </a:t>
-            </a:r>
-            <a:r>
-              <a:rPr lang="en-GB" sz="3400" dirty="0"/>
-              <a:t>Here, only the Nodes are needed, that are part of the Node tuple created in the second iteration. </a:t>
-            </a:r>
-          </a:p>
-          <a:p>
-            <a:pPr marL="457200" indent="-457200" algn="just">
-              <a:buFont typeface="Arial" panose="020B0604020202020204" pitchFamily="34" charset="0"/>
-              <a:buChar char="•"/>
-            </a:pPr>
-            <a:r>
-              <a:rPr lang="en-GB" sz="3400" dirty="0"/>
-              <a:t>These results are converted to a Pandas </a:t>
-            </a:r>
-            <a:r>
-              <a:rPr lang="en-GB" sz="3400" dirty="0" err="1"/>
-              <a:t>DataFrame</a:t>
-            </a:r>
-            <a:r>
-              <a:rPr lang="en-GB" sz="3400" dirty="0"/>
-              <a:t> and stored in a separate CSV-File for each Object.</a:t>
-            </a:r>
-            <a:endParaRPr lang="en-US" sz="3400" dirty="0"/>
-          </a:p>
-          <a:p>
-            <a:pPr algn="just"/>
-            <a:endParaRPr lang="en-US" sz="3400" dirty="0"/>
-          </a:p>
-        </p:txBody>
-      </p:sp>
-      <p:sp>
-        <p:nvSpPr>
           <p:cNvPr id="146" name="Textfeld 145"/>
           <p:cNvSpPr txBox="1"/>
           <p:nvPr/>
         </p:nvSpPr>
         <p:spPr>
           <a:xfrm>
-            <a:off x="15903651" y="21802468"/>
+            <a:off x="15610020" y="31564799"/>
             <a:ext cx="14420482" cy="830997"/>
           </a:xfrm>
           <a:prstGeom prst="rect">
@@ -9128,7 +9035,7 @@
         </p:nvSpPr>
         <p:spPr>
           <a:xfrm>
-            <a:off x="1368627" y="29694113"/>
+            <a:off x="16512045" y="8434710"/>
             <a:ext cx="8953092" cy="830997"/>
           </a:xfrm>
           <a:prstGeom prst="rect">
@@ -9150,71 +9057,6 @@
           </a:p>
         </p:txBody>
       </p:sp>
-      <p:cxnSp>
-        <p:nvCxnSpPr>
-          <p:cNvPr id="156" name="Gerade Verbindung 155"/>
-          <p:cNvCxnSpPr/>
-          <p:nvPr/>
-        </p:nvCxnSpPr>
-        <p:spPr>
-          <a:xfrm>
-            <a:off x="15842681" y="30668637"/>
-            <a:ext cx="14402370" cy="0"/>
-          </a:xfrm>
-          <a:prstGeom prst="line">
-            <a:avLst/>
-          </a:prstGeom>
-          <a:ln w="57150">
-            <a:solidFill>
-              <a:schemeClr val="accent3"/>
-            </a:solidFill>
-          </a:ln>
-        </p:spPr>
-        <p:style>
-          <a:lnRef idx="2">
-            <a:schemeClr val="accent1"/>
-          </a:lnRef>
-          <a:fillRef idx="0">
-            <a:schemeClr val="accent1"/>
-          </a:fillRef>
-          <a:effectRef idx="1">
-            <a:schemeClr val="accent1"/>
-          </a:effectRef>
-          <a:fontRef idx="minor">
-            <a:schemeClr val="tx1"/>
-          </a:fontRef>
-        </p:style>
-      </p:cxnSp>
-      <p:sp>
-        <p:nvSpPr>
-          <p:cNvPr id="157" name="Textfeld 156"/>
-          <p:cNvSpPr txBox="1"/>
-          <p:nvPr/>
-        </p:nvSpPr>
-        <p:spPr>
-          <a:xfrm>
-            <a:off x="15955900" y="29694113"/>
-            <a:ext cx="4365298" cy="830997"/>
-          </a:xfrm>
-          <a:prstGeom prst="rect">
-            <a:avLst/>
-          </a:prstGeom>
-          <a:noFill/>
-        </p:spPr>
-        <p:txBody>
-          <a:bodyPr wrap="none" rtlCol="0">
-            <a:spAutoFit/>
-          </a:bodyPr>
-          <a:lstStyle/>
-          <a:p>
-            <a:r>
-              <a:rPr lang="en-US" sz="4800" b="1" dirty="0"/>
-              <a:t>Scenario 3: xx</a:t>
-            </a:r>
-            <a:endParaRPr lang="en-US" sz="4000" b="1" dirty="0"/>
-          </a:p>
-        </p:txBody>
-      </p:sp>
       <p:sp>
         <p:nvSpPr>
           <p:cNvPr id="164" name="Textfeld 163"/>
@@ -9223,7 +9065,7 @@
         </p:nvSpPr>
         <p:spPr>
           <a:xfrm>
-            <a:off x="15746219" y="9596992"/>
+            <a:off x="15487790" y="16800375"/>
             <a:ext cx="13946164" cy="3600986"/>
           </a:xfrm>
           <a:prstGeom prst="rect">
@@ -9253,7 +9095,7 @@
             </a:pPr>
             <a:r>
               <a:rPr lang="en-GB" sz="3400" dirty="0"/>
-              <a:t>If a line has the same start- or endpoint and the voltage is the same it is considered as a neighbour.</a:t>
+              <a:t>If a line has the same start- or endpoint and the voltage is the same, it is considered as a neighbour.</a:t>
             </a:r>
           </a:p>
           <a:p>
@@ -9287,7 +9129,7 @@
         </p:nvSpPr>
         <p:spPr>
           <a:xfrm>
-            <a:off x="1240823" y="31225786"/>
+            <a:off x="16384241" y="9768869"/>
             <a:ext cx="13309440" cy="5786199"/>
           </a:xfrm>
           <a:prstGeom prst="rect">
@@ -9339,7 +9181,7 @@
               <a:rPr lang="en-GB" sz="3400" spc="-5" dirty="0">
                 <a:ea typeface="MS Mincho"/>
               </a:rPr>
-              <a:t> and partly split it up. For example the ways Table is separated in substations and lines/cables. </a:t>
+              <a:t> and partly split it up. For example, the ways Table is separated in substations and lines/cables. </a:t>
             </a:r>
           </a:p>
           <a:p>
@@ -9380,55 +9222,6 @@
             <a:endParaRPr lang="en-GB" sz="3400" spc="-5" dirty="0">
               <a:ea typeface="MS Mincho"/>
             </a:endParaRPr>
-          </a:p>
-        </p:txBody>
-      </p:sp>
-      <p:sp>
-        <p:nvSpPr>
-          <p:cNvPr id="169" name="Textfeld 168"/>
-          <p:cNvSpPr txBox="1"/>
-          <p:nvPr/>
-        </p:nvSpPr>
-        <p:spPr>
-          <a:xfrm>
-            <a:off x="15871256" y="30872404"/>
-            <a:ext cx="13292690" cy="1292662"/>
-          </a:xfrm>
-          <a:prstGeom prst="rect">
-            <a:avLst/>
-          </a:prstGeom>
-          <a:noFill/>
-        </p:spPr>
-        <p:txBody>
-          <a:bodyPr wrap="square" rtlCol="0">
-            <a:spAutoFit/>
-          </a:bodyPr>
-          <a:lstStyle/>
-          <a:p>
-            <a:pPr marL="457200" indent="-457200" algn="just">
-              <a:spcAft>
-                <a:spcPts val="1200"/>
-              </a:spcAft>
-              <a:buFont typeface="Arial" panose="020B0604020202020204" pitchFamily="34" charset="0"/>
-              <a:buChar char="•"/>
-            </a:pPr>
-            <a:r>
-              <a:rPr lang="en-US" sz="3400" dirty="0"/>
-              <a:t>Text</a:t>
-            </a:r>
-          </a:p>
-          <a:p>
-            <a:pPr marL="457200" indent="-457200" algn="just">
-              <a:spcAft>
-                <a:spcPts val="1200"/>
-              </a:spcAft>
-              <a:buFont typeface="Arial" panose="020B0604020202020204" pitchFamily="34" charset="0"/>
-              <a:buChar char="•"/>
-            </a:pPr>
-            <a:r>
-              <a:rPr lang="en-US" sz="3400" dirty="0"/>
-              <a:t>text</a:t>
-            </a:r>
           </a:p>
         </p:txBody>
       </p:sp>
@@ -9588,7 +9381,7 @@
         </p:nvSpPr>
         <p:spPr>
           <a:xfrm>
-            <a:off x="15955900" y="23581895"/>
+            <a:off x="15662269" y="33344226"/>
             <a:ext cx="4666226" cy="584775"/>
           </a:xfrm>
           <a:prstGeom prst="rect">
@@ -9664,8 +9457,8 @@
         </p:nvSpPr>
         <p:spPr>
           <a:xfrm>
-            <a:off x="1078017" y="9734433"/>
-            <a:ext cx="13338017" cy="7971413"/>
+            <a:off x="1078017" y="9541911"/>
+            <a:ext cx="13338017" cy="8987076"/>
           </a:xfrm>
           <a:prstGeom prst="rect">
             <a:avLst/>
@@ -9678,36 +9471,32 @@
           </a:bodyPr>
           <a:lstStyle/>
           <a:p>
-            <a:pPr algn="just"/>
-            <a:r>
-              <a:rPr lang="en-US" sz="3200" dirty="0"/>
+            <a:pPr indent="355600" algn="just"/>
+            <a:r>
+              <a:rPr lang="en-US" sz="3400" dirty="0"/>
               <a:t>As decentralization of generation of electricity is going forward as sustainable energy is in focus more than ever, more electrical grid models are needed, e.g. to simulate power flow. Countries of the global south and especially Africa could gain much from this transition and models, which brings the need of public, open-source models being available. This project makes a step forward contributing to this issue by using OSM data and Python as a programming language to develop an existing open grid model for the German transmission network into an open tool for creating electrical grid models.</a:t>
             </a:r>
           </a:p>
           <a:p>
-            <a:pPr algn="just"/>
-            <a:endParaRPr lang="en-US" sz="3200" dirty="0"/>
-          </a:p>
-          <a:p>
-            <a:pPr algn="just"/>
-            <a:r>
-              <a:rPr lang="en-US" sz="3200" dirty="0"/>
+            <a:pPr indent="355600" algn="just"/>
+            <a:r>
+              <a:rPr lang="en-US" sz="3400" dirty="0"/>
               <a:t>Existing German model: The existing German model “</a:t>
             </a:r>
             <a:r>
-              <a:rPr lang="en-US" sz="3200" dirty="0" err="1"/>
+              <a:rPr lang="en-US" sz="3400" dirty="0" err="1"/>
               <a:t>osmTGmod</a:t>
             </a:r>
             <a:r>
-              <a:rPr lang="en-US" sz="3200" dirty="0"/>
+              <a:rPr lang="en-US" sz="3400" dirty="0"/>
               <a:t>” uses several programming languages SQL, PostgreSQL and pl/</a:t>
             </a:r>
             <a:r>
-              <a:rPr lang="en-US" sz="3200" dirty="0" err="1"/>
+              <a:rPr lang="en-US" sz="3400" dirty="0" err="1"/>
               <a:t>pgSQL</a:t>
             </a:r>
             <a:r>
-              <a:rPr lang="en-US" sz="3200" dirty="0"/>
+              <a:rPr lang="en-US" sz="3400" dirty="0"/>
               <a:t>, Python as well as software and databases, which are no longer state-of-the-art and increase computing time. Therefore, in this project, there is a state-of-the-art approach with the programming language Python, which allows the reduction of the software and computing time needed.</a:t>
             </a:r>
           </a:p>
@@ -9735,7 +9524,7 @@
         </p:blipFill>
         <p:spPr>
           <a:xfrm>
-            <a:off x="17921274" y="16136241"/>
+            <a:off x="17558007" y="23125534"/>
             <a:ext cx="9180830" cy="4348815"/>
           </a:xfrm>
           <a:prstGeom prst="rect">
@@ -9743,6 +9532,1080 @@
           </a:prstGeom>
         </p:spPr>
       </p:pic>
+      <p:cxnSp>
+        <p:nvCxnSpPr>
+          <p:cNvPr id="4" name="Gerade Verbindung 37">
+            <a:extLst>
+              <a:ext uri="{FF2B5EF4-FFF2-40B4-BE49-F238E27FC236}">
+                <a16:creationId xmlns:a16="http://schemas.microsoft.com/office/drawing/2014/main" id="{95EB6FF5-B5EE-99C1-FE25-1CC9DF8D24F1}"/>
+              </a:ext>
+            </a:extLst>
+          </p:cNvPr>
+          <p:cNvCxnSpPr/>
+          <p:nvPr/>
+        </p:nvCxnSpPr>
+        <p:spPr>
+          <a:xfrm>
+            <a:off x="0" y="19496764"/>
+            <a:ext cx="14396625" cy="0"/>
+          </a:xfrm>
+          <a:prstGeom prst="line">
+            <a:avLst/>
+          </a:prstGeom>
+          <a:ln w="57150">
+            <a:solidFill>
+              <a:schemeClr val="accent3"/>
+            </a:solidFill>
+          </a:ln>
+        </p:spPr>
+        <p:style>
+          <a:lnRef idx="2">
+            <a:schemeClr val="accent1"/>
+          </a:lnRef>
+          <a:fillRef idx="0">
+            <a:schemeClr val="accent1"/>
+          </a:fillRef>
+          <a:effectRef idx="1">
+            <a:schemeClr val="accent1"/>
+          </a:effectRef>
+          <a:fontRef idx="minor">
+            <a:schemeClr val="tx1"/>
+          </a:fontRef>
+        </p:style>
+      </p:cxnSp>
+      <p:sp>
+        <p:nvSpPr>
+          <p:cNvPr id="7" name="Textfeld 6">
+            <a:extLst>
+              <a:ext uri="{FF2B5EF4-FFF2-40B4-BE49-F238E27FC236}">
+                <a16:creationId xmlns:a16="http://schemas.microsoft.com/office/drawing/2014/main" id="{CD481628-C308-4DAC-4E10-230EA0948899}"/>
+              </a:ext>
+            </a:extLst>
+          </p:cNvPr>
+          <p:cNvSpPr txBox="1"/>
+          <p:nvPr/>
+        </p:nvSpPr>
+        <p:spPr>
+          <a:xfrm>
+            <a:off x="1310514" y="18623097"/>
+            <a:ext cx="7409401" cy="830997"/>
+          </a:xfrm>
+          <a:prstGeom prst="rect">
+            <a:avLst/>
+          </a:prstGeom>
+          <a:noFill/>
+        </p:spPr>
+        <p:txBody>
+          <a:bodyPr wrap="none" rtlCol="0">
+            <a:spAutoFit/>
+          </a:bodyPr>
+          <a:lstStyle/>
+          <a:p>
+            <a:r>
+              <a:rPr lang="en-US" sz="4800" b="1" dirty="0"/>
+              <a:t>1. OpenStreetMap (OSM)</a:t>
+            </a:r>
+            <a:endParaRPr lang="en-US" sz="4000" b="1" dirty="0"/>
+          </a:p>
+        </p:txBody>
+      </p:sp>
+      <p:sp>
+        <p:nvSpPr>
+          <p:cNvPr id="8" name="Textfeld 7">
+            <a:extLst>
+              <a:ext uri="{FF2B5EF4-FFF2-40B4-BE49-F238E27FC236}">
+                <a16:creationId xmlns:a16="http://schemas.microsoft.com/office/drawing/2014/main" id="{EF702935-3A9C-6FEC-BB2A-8BBBF2F6179F}"/>
+              </a:ext>
+            </a:extLst>
+          </p:cNvPr>
+          <p:cNvSpPr txBox="1"/>
+          <p:nvPr/>
+        </p:nvSpPr>
+        <p:spPr>
+          <a:xfrm>
+            <a:off x="1367389" y="33249115"/>
+            <a:ext cx="13206660" cy="7940635"/>
+          </a:xfrm>
+          <a:prstGeom prst="rect">
+            <a:avLst/>
+          </a:prstGeom>
+          <a:noFill/>
+        </p:spPr>
+        <p:txBody>
+          <a:bodyPr wrap="square" rtlCol="0">
+            <a:spAutoFit/>
+          </a:bodyPr>
+          <a:lstStyle/>
+          <a:p>
+            <a:pPr marL="457200" indent="-457200" algn="just">
+              <a:buFont typeface="Arial" panose="020B0604020202020204" pitchFamily="34" charset="0"/>
+              <a:buChar char="•"/>
+            </a:pPr>
+            <a:r>
+              <a:rPr lang="en-US" sz="3400" dirty="0"/>
+              <a:t>The OSM data includes all data of the selected region. Hence the data must be filtered to sort out unnecessary objects like streets and bus lines. For that three Iterations are used:</a:t>
+            </a:r>
+          </a:p>
+          <a:p>
+            <a:pPr marL="457200" indent="-457200" algn="just">
+              <a:buFont typeface="Arial" panose="020B0604020202020204" pitchFamily="34" charset="0"/>
+              <a:buChar char="•"/>
+            </a:pPr>
+            <a:r>
+              <a:rPr lang="en-US" sz="3400" dirty="0"/>
+              <a:t>1. Objects of the class Relation with the value “power” for the tag “route” are saved as a Python tuple object.</a:t>
+            </a:r>
+          </a:p>
+          <a:p>
+            <a:pPr marL="457200" indent="-457200" algn="just">
+              <a:buFont typeface="Arial" panose="020B0604020202020204" pitchFamily="34" charset="0"/>
+              <a:buChar char="•"/>
+            </a:pPr>
+            <a:r>
+              <a:rPr lang="en-US" sz="3400" dirty="0"/>
+              <a:t>2. Objects of the class Ways with the tag “power” or if the Way object can be found in the before saved list of Relations. Also, all Nodes listed in this Way object are saved.</a:t>
+            </a:r>
+          </a:p>
+          <a:p>
+            <a:pPr marL="457200" indent="-457200" algn="just">
+              <a:buFont typeface="Arial" panose="020B0604020202020204" pitchFamily="34" charset="0"/>
+              <a:buChar char="•"/>
+            </a:pPr>
+            <a:r>
+              <a:rPr lang="en-US" sz="3400" spc="-5" dirty="0">
+                <a:ea typeface="MS Mincho"/>
+              </a:rPr>
+              <a:t>3. Objects of the class Nodes are considered. </a:t>
+            </a:r>
+            <a:r>
+              <a:rPr lang="en-GB" sz="3400" spc="-5" dirty="0">
+                <a:ea typeface="MS Mincho"/>
+              </a:rPr>
+              <a:t>Here, only the Nodes are needed, that are part of the Node tuple created in the second iteration. </a:t>
+            </a:r>
+          </a:p>
+          <a:p>
+            <a:pPr marL="457200" indent="-457200" algn="just">
+              <a:buFont typeface="Arial" panose="020B0604020202020204" pitchFamily="34" charset="0"/>
+              <a:buChar char="•"/>
+            </a:pPr>
+            <a:r>
+              <a:rPr lang="en-GB" sz="3400" spc="-5" dirty="0">
+                <a:ea typeface="MS Mincho"/>
+              </a:rPr>
+              <a:t>These results are converted to a Pandas </a:t>
+            </a:r>
+            <a:r>
+              <a:rPr lang="en-GB" sz="3400" spc="-5" dirty="0" err="1">
+                <a:ea typeface="MS Mincho"/>
+              </a:rPr>
+              <a:t>DataFrame</a:t>
+            </a:r>
+            <a:r>
+              <a:rPr lang="en-GB" sz="3400" spc="-5" dirty="0">
+                <a:ea typeface="MS Mincho"/>
+              </a:rPr>
+              <a:t> and stored in a separate CSV-File for each Object.</a:t>
+            </a:r>
+            <a:endParaRPr lang="en-US" sz="3400" spc="-5" dirty="0">
+              <a:ea typeface="MS Mincho"/>
+            </a:endParaRPr>
+          </a:p>
+          <a:p>
+            <a:pPr marL="457200" indent="-457200" algn="just">
+              <a:buFont typeface="Arial" panose="020B0604020202020204" pitchFamily="34" charset="0"/>
+              <a:buChar char="•"/>
+            </a:pPr>
+            <a:endParaRPr lang="en-US" sz="3400" dirty="0"/>
+          </a:p>
+          <a:p>
+            <a:pPr algn="just"/>
+            <a:endParaRPr lang="en-US" sz="3400" dirty="0"/>
+          </a:p>
+        </p:txBody>
+      </p:sp>
+      <p:sp>
+        <p:nvSpPr>
+          <p:cNvPr id="9" name="Textfeld 8">
+            <a:extLst>
+              <a:ext uri="{FF2B5EF4-FFF2-40B4-BE49-F238E27FC236}">
+                <a16:creationId xmlns:a16="http://schemas.microsoft.com/office/drawing/2014/main" id="{72E06EEE-BB3F-1CFD-A2F4-A11BAFA5F056}"/>
+              </a:ext>
+            </a:extLst>
+          </p:cNvPr>
+          <p:cNvSpPr txBox="1"/>
+          <p:nvPr/>
+        </p:nvSpPr>
+        <p:spPr>
+          <a:xfrm>
+            <a:off x="1078016" y="19819608"/>
+            <a:ext cx="13415071" cy="5324535"/>
+          </a:xfrm>
+          <a:prstGeom prst="rect">
+            <a:avLst/>
+          </a:prstGeom>
+          <a:noFill/>
+        </p:spPr>
+        <p:txBody>
+          <a:bodyPr wrap="square" rtlCol="0">
+            <a:spAutoFit/>
+          </a:bodyPr>
+          <a:lstStyle/>
+          <a:p>
+            <a:pPr algn="just"/>
+            <a:r>
+              <a:rPr lang="de-DE" sz="3400" dirty="0"/>
+              <a:t>OSM </a:t>
+            </a:r>
+            <a:r>
+              <a:rPr lang="de-DE" sz="3400" dirty="0" err="1"/>
+              <a:t>is</a:t>
+            </a:r>
+            <a:r>
+              <a:rPr lang="de-DE" sz="3400" dirty="0"/>
+              <a:t> </a:t>
+            </a:r>
+            <a:r>
+              <a:rPr lang="de-DE" sz="3400" dirty="0" err="1"/>
+              <a:t>the</a:t>
+            </a:r>
+            <a:r>
+              <a:rPr lang="de-DE" sz="3400" dirty="0"/>
+              <a:t> </a:t>
+            </a:r>
+            <a:r>
+              <a:rPr lang="de-DE" sz="3400" dirty="0" err="1"/>
+              <a:t>biggest</a:t>
+            </a:r>
+            <a:r>
+              <a:rPr lang="de-DE" sz="3400" dirty="0"/>
+              <a:t> open-source </a:t>
+            </a:r>
+            <a:r>
+              <a:rPr lang="de-DE" sz="3400" dirty="0" err="1"/>
+              <a:t>geodatabase</a:t>
+            </a:r>
+            <a:r>
+              <a:rPr lang="de-DE" sz="3400" dirty="0"/>
+              <a:t> </a:t>
+            </a:r>
+            <a:r>
+              <a:rPr lang="de-DE" sz="3400" dirty="0" err="1"/>
+              <a:t>worldwide</a:t>
+            </a:r>
+            <a:r>
+              <a:rPr lang="de-DE" sz="3400" dirty="0"/>
+              <a:t>, </a:t>
+            </a:r>
+            <a:r>
+              <a:rPr lang="de-DE" sz="3400" dirty="0" err="1"/>
+              <a:t>where</a:t>
+            </a:r>
+            <a:r>
+              <a:rPr lang="de-DE" sz="3400" dirty="0"/>
+              <a:t> </a:t>
+            </a:r>
+            <a:r>
+              <a:rPr lang="de-DE" sz="3400" dirty="0" err="1"/>
+              <a:t>everyone</a:t>
+            </a:r>
+            <a:r>
+              <a:rPr lang="de-DE" sz="3400" dirty="0"/>
+              <a:t> </a:t>
+            </a:r>
+            <a:r>
+              <a:rPr lang="de-DE" sz="3400" dirty="0" err="1"/>
+              <a:t>can</a:t>
+            </a:r>
+            <a:r>
+              <a:rPr lang="de-DE" sz="3400" dirty="0"/>
+              <a:t> </a:t>
+            </a:r>
+            <a:r>
+              <a:rPr lang="de-DE" sz="3400" dirty="0" err="1"/>
+              <a:t>contribute</a:t>
+            </a:r>
+            <a:r>
+              <a:rPr lang="de-DE" sz="3400" dirty="0"/>
+              <a:t> </a:t>
+            </a:r>
+            <a:r>
+              <a:rPr lang="de-DE" sz="3400" dirty="0" err="1"/>
+              <a:t>with</a:t>
+            </a:r>
+            <a:r>
+              <a:rPr lang="de-DE" sz="3400" dirty="0"/>
+              <a:t> </a:t>
+            </a:r>
+            <a:r>
+              <a:rPr lang="de-DE" sz="3400" dirty="0" err="1"/>
+              <a:t>their</a:t>
+            </a:r>
+            <a:r>
+              <a:rPr lang="de-DE" sz="3400" dirty="0"/>
+              <a:t> </a:t>
+            </a:r>
+            <a:r>
+              <a:rPr lang="de-DE" sz="3400" dirty="0" err="1"/>
+              <a:t>input</a:t>
+            </a:r>
+            <a:r>
+              <a:rPr lang="de-DE" sz="3400" dirty="0"/>
+              <a:t> </a:t>
+            </a:r>
+            <a:r>
+              <a:rPr lang="de-DE" sz="3400" dirty="0" err="1"/>
+              <a:t>by</a:t>
+            </a:r>
+            <a:r>
+              <a:rPr lang="de-DE" sz="3400" dirty="0"/>
+              <a:t> </a:t>
+            </a:r>
+            <a:r>
+              <a:rPr lang="de-DE" sz="3400" dirty="0" err="1"/>
+              <a:t>adding</a:t>
+            </a:r>
+            <a:r>
+              <a:rPr lang="de-DE" sz="3400" dirty="0"/>
+              <a:t> </a:t>
+            </a:r>
+            <a:r>
+              <a:rPr lang="de-DE" sz="3400" dirty="0" err="1"/>
+              <a:t>or</a:t>
+            </a:r>
+            <a:r>
+              <a:rPr lang="de-DE" sz="3400" dirty="0"/>
+              <a:t> </a:t>
+            </a:r>
+            <a:r>
+              <a:rPr lang="de-DE" sz="3400" dirty="0" err="1"/>
+              <a:t>adapting</a:t>
+            </a:r>
+            <a:r>
+              <a:rPr lang="de-DE" sz="3400" dirty="0"/>
+              <a:t> </a:t>
+            </a:r>
+            <a:r>
+              <a:rPr lang="de-DE" sz="3400" dirty="0" err="1"/>
+              <a:t>information</a:t>
+            </a:r>
+            <a:r>
+              <a:rPr lang="de-DE" sz="3400" dirty="0"/>
+              <a:t>.</a:t>
+            </a:r>
+          </a:p>
+          <a:p>
+            <a:pPr algn="just"/>
+            <a:endParaRPr lang="de-DE" sz="3400" dirty="0"/>
+          </a:p>
+          <a:p>
+            <a:pPr algn="just"/>
+            <a:r>
+              <a:rPr lang="de-DE" sz="3400" dirty="0"/>
+              <a:t>As </a:t>
+            </a:r>
+            <a:r>
+              <a:rPr lang="de-DE" sz="3400" dirty="0" err="1"/>
+              <a:t>it</a:t>
+            </a:r>
+            <a:r>
+              <a:rPr lang="de-DE" sz="3400" dirty="0"/>
+              <a:t> </a:t>
+            </a:r>
+            <a:r>
+              <a:rPr lang="de-DE" sz="3400" dirty="0" err="1"/>
+              <a:t>is</a:t>
+            </a:r>
+            <a:r>
+              <a:rPr lang="de-DE" sz="3400" dirty="0"/>
+              <a:t> </a:t>
+            </a:r>
+            <a:r>
+              <a:rPr lang="de-DE" sz="3400" dirty="0" err="1"/>
+              <a:t>showed</a:t>
+            </a:r>
+            <a:r>
+              <a:rPr lang="de-DE" sz="3400" dirty="0"/>
+              <a:t> in Figure 1,  </a:t>
+            </a:r>
+            <a:r>
+              <a:rPr lang="de-DE" sz="3400" dirty="0" err="1"/>
+              <a:t>the</a:t>
+            </a:r>
+            <a:r>
+              <a:rPr lang="de-DE" sz="3400" dirty="0"/>
+              <a:t> </a:t>
+            </a:r>
+            <a:r>
+              <a:rPr lang="de-DE" sz="3400" dirty="0" err="1"/>
+              <a:t>main</a:t>
+            </a:r>
+            <a:r>
+              <a:rPr lang="de-DE" sz="3400" dirty="0"/>
+              <a:t> </a:t>
+            </a:r>
+            <a:r>
+              <a:rPr lang="de-DE" sz="3400" dirty="0" err="1"/>
+              <a:t>components</a:t>
+            </a:r>
+            <a:r>
+              <a:rPr lang="de-DE" sz="3400" dirty="0"/>
+              <a:t> </a:t>
+            </a:r>
+            <a:r>
+              <a:rPr lang="de-DE" sz="3400" dirty="0" err="1"/>
+              <a:t>of</a:t>
+            </a:r>
+            <a:r>
+              <a:rPr lang="de-DE" sz="3400" dirty="0"/>
+              <a:t> </a:t>
+            </a:r>
+            <a:r>
+              <a:rPr lang="de-DE" sz="3400" dirty="0" err="1"/>
+              <a:t>the</a:t>
+            </a:r>
+            <a:r>
+              <a:rPr lang="de-DE" sz="3400" dirty="0"/>
+              <a:t> OSM-Database </a:t>
+            </a:r>
+            <a:r>
+              <a:rPr lang="de-DE" sz="3400" dirty="0" err="1"/>
+              <a:t>are</a:t>
+            </a:r>
+            <a:endParaRPr lang="de-DE" sz="3400" dirty="0"/>
+          </a:p>
+          <a:p>
+            <a:pPr marL="714375" lvl="1" indent="-457200" algn="just">
+              <a:buFont typeface="Arial" panose="020B0604020202020204" pitchFamily="34" charset="0"/>
+              <a:buChar char="•"/>
+            </a:pPr>
+            <a:r>
+              <a:rPr lang="de-DE" sz="3400" dirty="0"/>
+              <a:t>Nodes, </a:t>
+            </a:r>
+            <a:r>
+              <a:rPr lang="de-DE" sz="3400" dirty="0" err="1"/>
+              <a:t>which</a:t>
+            </a:r>
+            <a:r>
+              <a:rPr lang="de-DE" sz="3400" dirty="0"/>
+              <a:t> </a:t>
+            </a:r>
+            <a:r>
+              <a:rPr lang="de-DE" sz="3400" dirty="0" err="1"/>
+              <a:t>are</a:t>
+            </a:r>
+            <a:r>
+              <a:rPr lang="de-DE" sz="3400" dirty="0"/>
+              <a:t> </a:t>
+            </a:r>
+            <a:r>
+              <a:rPr lang="de-DE" sz="3400" dirty="0" err="1"/>
+              <a:t>composed</a:t>
+            </a:r>
+            <a:r>
+              <a:rPr lang="de-DE" sz="3400" dirty="0"/>
+              <a:t> </a:t>
+            </a:r>
+            <a:r>
+              <a:rPr lang="de-DE" sz="3400" dirty="0" err="1"/>
+              <a:t>of</a:t>
+            </a:r>
+            <a:r>
+              <a:rPr lang="de-DE" sz="3400" dirty="0"/>
+              <a:t> a </a:t>
+            </a:r>
+            <a:r>
+              <a:rPr lang="de-DE" sz="3400" dirty="0" err="1"/>
+              <a:t>set</a:t>
+            </a:r>
+            <a:r>
+              <a:rPr lang="de-DE" sz="3400" dirty="0"/>
+              <a:t> </a:t>
+            </a:r>
+            <a:r>
+              <a:rPr lang="de-DE" sz="3400" dirty="0" err="1"/>
+              <a:t>of</a:t>
+            </a:r>
+            <a:r>
+              <a:rPr lang="de-DE" sz="3400" dirty="0"/>
+              <a:t> </a:t>
+            </a:r>
+            <a:r>
+              <a:rPr lang="de-DE" sz="3400" dirty="0" err="1"/>
+              <a:t>coordinates</a:t>
+            </a:r>
+            <a:r>
+              <a:rPr lang="de-DE" sz="3400" dirty="0"/>
+              <a:t>, </a:t>
+            </a:r>
+            <a:r>
+              <a:rPr lang="de-DE" sz="3400" dirty="0" err="1"/>
+              <a:t>represent</a:t>
+            </a:r>
+            <a:r>
+              <a:rPr lang="de-DE" sz="3400" dirty="0"/>
+              <a:t> </a:t>
+            </a:r>
+            <a:r>
+              <a:rPr lang="de-DE" sz="3400" dirty="0" err="1"/>
+              <a:t>point</a:t>
+            </a:r>
+            <a:r>
+              <a:rPr lang="de-DE" sz="3400" dirty="0"/>
+              <a:t> </a:t>
+            </a:r>
+            <a:r>
+              <a:rPr lang="de-DE" sz="3400" dirty="0" err="1"/>
+              <a:t>objects</a:t>
+            </a:r>
+            <a:r>
+              <a:rPr lang="de-DE" sz="3400" dirty="0"/>
+              <a:t>: in </a:t>
+            </a:r>
+            <a:r>
+              <a:rPr lang="de-DE" sz="3400" dirty="0" err="1"/>
+              <a:t>terms</a:t>
+            </a:r>
+            <a:r>
+              <a:rPr lang="de-DE" sz="3400" dirty="0"/>
+              <a:t> </a:t>
+            </a:r>
+            <a:r>
+              <a:rPr lang="de-DE" sz="3400" dirty="0" err="1"/>
+              <a:t>of</a:t>
+            </a:r>
+            <a:r>
+              <a:rPr lang="de-DE" sz="3400" dirty="0"/>
+              <a:t> </a:t>
+            </a:r>
+            <a:r>
+              <a:rPr lang="de-DE" sz="3400" dirty="0" err="1"/>
+              <a:t>the</a:t>
+            </a:r>
+            <a:r>
+              <a:rPr lang="de-DE" sz="3400" dirty="0"/>
+              <a:t> </a:t>
+            </a:r>
+            <a:r>
+              <a:rPr lang="de-DE" sz="3400" dirty="0" err="1"/>
+              <a:t>electrical</a:t>
+            </a:r>
+            <a:r>
+              <a:rPr lang="de-DE" sz="3400" dirty="0"/>
+              <a:t> </a:t>
+            </a:r>
+            <a:r>
+              <a:rPr lang="de-DE" sz="3400" dirty="0" err="1"/>
+              <a:t>grid</a:t>
+            </a:r>
+            <a:r>
+              <a:rPr lang="de-DE" sz="3400" dirty="0"/>
+              <a:t>, power </a:t>
+            </a:r>
+            <a:r>
+              <a:rPr lang="de-DE" sz="3400" dirty="0" err="1"/>
+              <a:t>poles</a:t>
+            </a:r>
+            <a:r>
+              <a:rPr lang="de-DE" sz="3400" dirty="0"/>
+              <a:t>. </a:t>
+            </a:r>
+          </a:p>
+          <a:p>
+            <a:pPr marL="714375" lvl="1" indent="-457200" algn="just">
+              <a:buFont typeface="Arial" panose="020B0604020202020204" pitchFamily="34" charset="0"/>
+              <a:buChar char="•"/>
+            </a:pPr>
+            <a:r>
+              <a:rPr lang="de-DE" sz="3400" dirty="0" err="1"/>
+              <a:t>Ways</a:t>
+            </a:r>
+            <a:r>
+              <a:rPr lang="de-DE" sz="3400" dirty="0"/>
+              <a:t>, </a:t>
+            </a:r>
+            <a:r>
+              <a:rPr lang="de-DE" sz="3400" dirty="0" err="1"/>
+              <a:t>which</a:t>
+            </a:r>
+            <a:r>
+              <a:rPr lang="de-DE" sz="3400" dirty="0"/>
+              <a:t> </a:t>
+            </a:r>
+            <a:r>
+              <a:rPr lang="de-DE" sz="3400" dirty="0" err="1"/>
+              <a:t>represent</a:t>
+            </a:r>
+            <a:r>
+              <a:rPr lang="de-DE" sz="3400" dirty="0"/>
+              <a:t> </a:t>
+            </a:r>
+            <a:r>
+              <a:rPr lang="de-DE" sz="3400" dirty="0" err="1"/>
+              <a:t>line</a:t>
+            </a:r>
+            <a:r>
+              <a:rPr lang="de-DE" sz="3400" dirty="0"/>
+              <a:t> </a:t>
+            </a:r>
+            <a:r>
+              <a:rPr lang="de-DE" sz="3400" dirty="0" err="1"/>
+              <a:t>objects</a:t>
+            </a:r>
+            <a:r>
+              <a:rPr lang="de-DE" sz="3400" dirty="0"/>
+              <a:t> and connect </a:t>
+            </a:r>
+            <a:r>
+              <a:rPr lang="de-DE" sz="3400" dirty="0" err="1"/>
+              <a:t>the</a:t>
+            </a:r>
+            <a:r>
+              <a:rPr lang="de-DE" sz="3400" dirty="0"/>
+              <a:t> Nodes (</a:t>
+            </a:r>
+            <a:r>
+              <a:rPr lang="de-DE" sz="3400" dirty="0" err="1"/>
+              <a:t>connection</a:t>
+            </a:r>
+            <a:r>
+              <a:rPr lang="de-DE" sz="3400" dirty="0"/>
+              <a:t> </a:t>
+            </a:r>
+            <a:r>
+              <a:rPr lang="de-DE" sz="3400" dirty="0" err="1"/>
+              <a:t>of</a:t>
+            </a:r>
+            <a:r>
+              <a:rPr lang="de-DE" sz="3400" dirty="0"/>
+              <a:t> power </a:t>
+            </a:r>
+            <a:r>
+              <a:rPr lang="de-DE" sz="3400" dirty="0" err="1"/>
+              <a:t>poles</a:t>
+            </a:r>
+            <a:r>
+              <a:rPr lang="de-DE" sz="3400" dirty="0"/>
+              <a:t>)</a:t>
+            </a:r>
+          </a:p>
+        </p:txBody>
+      </p:sp>
+      <p:pic>
+        <p:nvPicPr>
+          <p:cNvPr id="10" name="Bild 1">
+            <a:extLst>
+              <a:ext uri="{FF2B5EF4-FFF2-40B4-BE49-F238E27FC236}">
+                <a16:creationId xmlns:a16="http://schemas.microsoft.com/office/drawing/2014/main" id="{6566866F-AFD2-7022-2D51-191E449980B1}"/>
+              </a:ext>
+            </a:extLst>
+          </p:cNvPr>
+          <p:cNvPicPr>
+            <a:picLocks noChangeAspect="1"/>
+          </p:cNvPicPr>
+          <p:nvPr/>
+        </p:nvPicPr>
+        <p:blipFill>
+          <a:blip r:embed="rId5" cstate="print">
+            <a:extLst>
+              <a:ext uri="{28A0092B-C50C-407E-A947-70E740481C1C}">
+                <a14:useLocalDpi xmlns:a14="http://schemas.microsoft.com/office/drawing/2010/main" val="0"/>
+              </a:ext>
+            </a:extLst>
+          </a:blip>
+          <a:srcRect/>
+          <a:stretch>
+            <a:fillRect/>
+          </a:stretch>
+        </p:blipFill>
+        <p:spPr bwMode="auto">
+          <a:xfrm>
+            <a:off x="8215836" y="25466986"/>
+            <a:ext cx="5892556" cy="4033343"/>
+          </a:xfrm>
+          <a:prstGeom prst="rect">
+            <a:avLst/>
+          </a:prstGeom>
+          <a:noFill/>
+          <a:ln>
+            <a:noFill/>
+          </a:ln>
+        </p:spPr>
+      </p:pic>
+      <p:sp>
+        <p:nvSpPr>
+          <p:cNvPr id="15" name="Textfeld 14">
+            <a:extLst>
+              <a:ext uri="{FF2B5EF4-FFF2-40B4-BE49-F238E27FC236}">
+                <a16:creationId xmlns:a16="http://schemas.microsoft.com/office/drawing/2014/main" id="{B2BCC090-78EB-2738-6776-3203F0033346}"/>
+              </a:ext>
+            </a:extLst>
+          </p:cNvPr>
+          <p:cNvSpPr txBox="1"/>
+          <p:nvPr/>
+        </p:nvSpPr>
+        <p:spPr>
+          <a:xfrm>
+            <a:off x="8215836" y="29500329"/>
+            <a:ext cx="5495192" cy="1446550"/>
+          </a:xfrm>
+          <a:prstGeom prst="rect">
+            <a:avLst/>
+          </a:prstGeom>
+          <a:noFill/>
+        </p:spPr>
+        <p:txBody>
+          <a:bodyPr wrap="square">
+            <a:spAutoFit/>
+          </a:bodyPr>
+          <a:lstStyle/>
+          <a:p>
+            <a:r>
+              <a:rPr lang="en-US" sz="2200" dirty="0"/>
+              <a:t>Figure 1: Simplified representation of the OpenStreetMap data model based on [11]. 0 … n means that an element may occur 0 to n times </a:t>
+            </a:r>
+            <a:endParaRPr lang="de-DE" sz="2200" dirty="0"/>
+          </a:p>
+        </p:txBody>
+      </p:sp>
+      <p:sp>
+        <p:nvSpPr>
+          <p:cNvPr id="18" name="Textfeld 17">
+            <a:extLst>
+              <a:ext uri="{FF2B5EF4-FFF2-40B4-BE49-F238E27FC236}">
+                <a16:creationId xmlns:a16="http://schemas.microsoft.com/office/drawing/2014/main" id="{E3260EE4-D7C7-6499-0C2E-637DFDB25B5E}"/>
+              </a:ext>
+            </a:extLst>
+          </p:cNvPr>
+          <p:cNvSpPr txBox="1"/>
+          <p:nvPr/>
+        </p:nvSpPr>
+        <p:spPr>
+          <a:xfrm>
+            <a:off x="1082480" y="25152543"/>
+            <a:ext cx="6703071" cy="6894195"/>
+          </a:xfrm>
+          <a:prstGeom prst="rect">
+            <a:avLst/>
+          </a:prstGeom>
+          <a:noFill/>
+        </p:spPr>
+        <p:txBody>
+          <a:bodyPr wrap="square">
+            <a:spAutoFit/>
+          </a:bodyPr>
+          <a:lstStyle/>
+          <a:p>
+            <a:pPr marL="714375" lvl="1" indent="-457200" algn="just">
+              <a:buFont typeface="Arial" panose="020B0604020202020204" pitchFamily="34" charset="0"/>
+              <a:buChar char="•"/>
+            </a:pPr>
+            <a:r>
+              <a:rPr lang="de-DE" sz="3400" dirty="0"/>
+              <a:t>Relations, </a:t>
+            </a:r>
+            <a:r>
+              <a:rPr lang="de-DE" sz="3400" dirty="0" err="1"/>
+              <a:t>which</a:t>
+            </a:r>
+            <a:r>
+              <a:rPr lang="de-DE" sz="3400" dirty="0"/>
+              <a:t> </a:t>
+            </a:r>
+            <a:r>
+              <a:rPr lang="de-DE" sz="3400" dirty="0" err="1"/>
+              <a:t>represent</a:t>
+            </a:r>
+            <a:r>
+              <a:rPr lang="de-DE" sz="3400" dirty="0"/>
+              <a:t> </a:t>
+            </a:r>
+            <a:r>
+              <a:rPr lang="de-DE" sz="3400" dirty="0" err="1"/>
+              <a:t>the</a:t>
+            </a:r>
+            <a:r>
+              <a:rPr lang="de-DE" sz="3400" dirty="0"/>
+              <a:t> </a:t>
+            </a:r>
+            <a:r>
+              <a:rPr lang="de-DE" sz="3400" dirty="0" err="1"/>
+              <a:t>correlation</a:t>
+            </a:r>
+            <a:r>
+              <a:rPr lang="de-DE" sz="3400" dirty="0"/>
+              <a:t> </a:t>
+            </a:r>
+            <a:r>
+              <a:rPr lang="de-DE" sz="3400" dirty="0" err="1"/>
+              <a:t>between</a:t>
+            </a:r>
+            <a:r>
+              <a:rPr lang="de-DE" sz="3400" dirty="0"/>
+              <a:t> different </a:t>
+            </a:r>
+            <a:r>
+              <a:rPr lang="de-DE" sz="3400" dirty="0" err="1"/>
+              <a:t>objects</a:t>
+            </a:r>
+            <a:r>
+              <a:rPr lang="de-DE" sz="3400" dirty="0"/>
+              <a:t>, </a:t>
+            </a:r>
+            <a:r>
+              <a:rPr lang="de-DE" sz="3400" dirty="0" err="1"/>
+              <a:t>consisting</a:t>
+            </a:r>
+            <a:r>
+              <a:rPr lang="de-DE" sz="3400" dirty="0"/>
+              <a:t> </a:t>
+            </a:r>
+            <a:r>
+              <a:rPr lang="de-DE" sz="3400" dirty="0" err="1"/>
+              <a:t>of</a:t>
+            </a:r>
+            <a:r>
+              <a:rPr lang="de-DE" sz="3400" dirty="0"/>
+              <a:t> a </a:t>
+            </a:r>
+            <a:r>
+              <a:rPr lang="de-DE" sz="3400" dirty="0" err="1"/>
+              <a:t>list</a:t>
+            </a:r>
+            <a:r>
+              <a:rPr lang="de-DE" sz="3400" dirty="0"/>
+              <a:t> </a:t>
+            </a:r>
+            <a:r>
+              <a:rPr lang="de-DE" sz="3400" dirty="0" err="1"/>
+              <a:t>of</a:t>
+            </a:r>
+            <a:r>
+              <a:rPr lang="de-DE" sz="3400" dirty="0"/>
+              <a:t> </a:t>
+            </a:r>
+            <a:r>
+              <a:rPr lang="de-DE" sz="3400" dirty="0" err="1"/>
+              <a:t>members</a:t>
+            </a:r>
+            <a:r>
+              <a:rPr lang="de-DE" sz="3400" dirty="0"/>
+              <a:t> such </a:t>
+            </a:r>
+            <a:r>
+              <a:rPr lang="de-DE" sz="3400" dirty="0" err="1"/>
+              <a:t>as</a:t>
+            </a:r>
+            <a:r>
+              <a:rPr lang="de-DE" sz="3400" dirty="0"/>
+              <a:t> Nodes and </a:t>
+            </a:r>
+            <a:r>
+              <a:rPr lang="de-DE" sz="3400" dirty="0" err="1"/>
+              <a:t>Ways</a:t>
+            </a:r>
+            <a:r>
+              <a:rPr lang="de-DE" sz="3400" dirty="0"/>
+              <a:t>, but also </a:t>
+            </a:r>
+            <a:r>
+              <a:rPr lang="de-DE" sz="3400" dirty="0" err="1"/>
+              <a:t>other</a:t>
+            </a:r>
+            <a:r>
+              <a:rPr lang="de-DE" sz="3400" dirty="0"/>
+              <a:t> Relations</a:t>
+            </a:r>
+          </a:p>
+          <a:p>
+            <a:pPr marL="714375" lvl="1" indent="-457200" algn="just">
+              <a:buFont typeface="Arial" panose="020B0604020202020204" pitchFamily="34" charset="0"/>
+              <a:buChar char="•"/>
+            </a:pPr>
+            <a:r>
+              <a:rPr lang="de-DE" sz="3400" dirty="0"/>
+              <a:t>Key-Value </a:t>
+            </a:r>
+            <a:r>
+              <a:rPr lang="de-DE" sz="3400" dirty="0" err="1"/>
+              <a:t>pairs</a:t>
+            </a:r>
+            <a:r>
+              <a:rPr lang="de-DE" sz="3400" dirty="0"/>
+              <a:t>, </a:t>
+            </a:r>
+            <a:r>
+              <a:rPr lang="de-DE" sz="3400" dirty="0" err="1"/>
+              <a:t>which</a:t>
+            </a:r>
+            <a:r>
+              <a:rPr lang="de-DE" sz="3400" dirty="0"/>
+              <a:t> </a:t>
+            </a:r>
+            <a:r>
+              <a:rPr lang="de-DE" sz="3400" dirty="0" err="1"/>
+              <a:t>is</a:t>
+            </a:r>
+            <a:r>
+              <a:rPr lang="de-DE" sz="3400" dirty="0"/>
+              <a:t> </a:t>
+            </a:r>
+            <a:r>
+              <a:rPr lang="de-DE" sz="3400" dirty="0" err="1"/>
+              <a:t>called</a:t>
+            </a:r>
+            <a:r>
+              <a:rPr lang="de-DE" sz="3400" dirty="0"/>
+              <a:t> a Tag. </a:t>
+            </a:r>
+            <a:r>
+              <a:rPr lang="de-DE" sz="3400" dirty="0" err="1"/>
+              <a:t>Each</a:t>
+            </a:r>
+            <a:r>
+              <a:rPr lang="de-DE" sz="3400" dirty="0"/>
+              <a:t> Tag </a:t>
+            </a:r>
+            <a:r>
+              <a:rPr lang="de-DE" sz="3400" dirty="0" err="1"/>
+              <a:t>defines</a:t>
+            </a:r>
+            <a:r>
+              <a:rPr lang="de-DE" sz="3400" dirty="0"/>
+              <a:t> </a:t>
+            </a:r>
+            <a:r>
+              <a:rPr lang="de-DE" sz="3400" dirty="0" err="1"/>
+              <a:t>the</a:t>
+            </a:r>
+            <a:r>
+              <a:rPr lang="de-DE" sz="3400" dirty="0"/>
+              <a:t> </a:t>
+            </a:r>
+            <a:r>
+              <a:rPr lang="de-DE" sz="3400" dirty="0" err="1"/>
+              <a:t>property</a:t>
+            </a:r>
+            <a:r>
+              <a:rPr lang="de-DE" sz="3400" dirty="0"/>
+              <a:t> an </a:t>
+            </a:r>
+            <a:r>
+              <a:rPr lang="de-DE" sz="3400" dirty="0" err="1"/>
+              <a:t>object</a:t>
+            </a:r>
+            <a:r>
+              <a:rPr lang="de-DE" sz="3400" dirty="0"/>
+              <a:t>, such </a:t>
+            </a:r>
+            <a:r>
+              <a:rPr lang="de-DE" sz="3400" dirty="0" err="1"/>
+              <a:t>as</a:t>
+            </a:r>
+            <a:r>
+              <a:rPr lang="de-DE" sz="3400" dirty="0"/>
+              <a:t> </a:t>
+            </a:r>
+            <a:r>
+              <a:rPr lang="de-DE" sz="3400" dirty="0" err="1"/>
+              <a:t>the</a:t>
+            </a:r>
+            <a:r>
+              <a:rPr lang="de-DE" sz="3400" dirty="0"/>
+              <a:t> </a:t>
+            </a:r>
+            <a:r>
+              <a:rPr lang="de-DE" sz="3400" dirty="0" err="1"/>
+              <a:t>voltage</a:t>
+            </a:r>
+            <a:r>
+              <a:rPr lang="de-DE" sz="3400" dirty="0"/>
+              <a:t> </a:t>
+            </a:r>
+            <a:r>
+              <a:rPr lang="de-DE" sz="3400" dirty="0" err="1"/>
+              <a:t>level</a:t>
+            </a:r>
+            <a:r>
+              <a:rPr lang="de-DE" sz="3400" dirty="0"/>
+              <a:t>, </a:t>
+            </a:r>
+            <a:r>
+              <a:rPr lang="de-DE" sz="3400" dirty="0" err="1"/>
+              <a:t>frequency</a:t>
+            </a:r>
+            <a:r>
+              <a:rPr lang="de-DE" sz="3400" dirty="0"/>
+              <a:t>, </a:t>
+            </a:r>
+            <a:r>
+              <a:rPr lang="de-DE" sz="3400" dirty="0" err="1"/>
+              <a:t>number</a:t>
+            </a:r>
+            <a:r>
+              <a:rPr lang="de-DE" sz="3400" dirty="0"/>
+              <a:t> </a:t>
+            </a:r>
+            <a:r>
+              <a:rPr lang="de-DE" sz="3400" dirty="0" err="1"/>
+              <a:t>of</a:t>
+            </a:r>
+            <a:r>
+              <a:rPr lang="de-DE" sz="3400" dirty="0"/>
+              <a:t> </a:t>
+            </a:r>
+            <a:r>
+              <a:rPr lang="de-DE" sz="3400" dirty="0" err="1"/>
+              <a:t>cables</a:t>
+            </a:r>
+            <a:r>
+              <a:rPr lang="de-DE" sz="3400" dirty="0"/>
+              <a:t> and </a:t>
+            </a:r>
+            <a:r>
+              <a:rPr lang="de-DE" sz="3400" dirty="0" err="1"/>
+              <a:t>wires</a:t>
+            </a:r>
+            <a:r>
+              <a:rPr lang="de-DE" sz="3400" dirty="0"/>
+              <a:t> per </a:t>
+            </a:r>
+            <a:r>
+              <a:rPr lang="de-DE" sz="3400" dirty="0" err="1"/>
+              <a:t>voltage</a:t>
+            </a:r>
+            <a:r>
+              <a:rPr lang="de-DE" sz="3400" dirty="0"/>
+              <a:t>, </a:t>
+            </a:r>
+            <a:r>
+              <a:rPr lang="de-DE" sz="3400" dirty="0" err="1"/>
+              <a:t>number</a:t>
+            </a:r>
+            <a:r>
+              <a:rPr lang="de-DE" sz="3400" dirty="0"/>
+              <a:t> </a:t>
+            </a:r>
+            <a:r>
+              <a:rPr lang="de-DE" sz="3400" dirty="0" err="1"/>
+              <a:t>of</a:t>
+            </a:r>
+            <a:r>
+              <a:rPr lang="de-DE" sz="3400" dirty="0"/>
+              <a:t> </a:t>
+            </a:r>
+            <a:r>
+              <a:rPr lang="de-DE" sz="3400" dirty="0" err="1"/>
+              <a:t>circuits</a:t>
+            </a:r>
+            <a:r>
+              <a:rPr lang="de-DE" sz="3400" dirty="0"/>
+              <a:t>.</a:t>
+            </a:r>
+          </a:p>
+        </p:txBody>
+      </p:sp>
     </p:spTree>
     <p:extLst>
       <p:ext uri="{BB962C8B-B14F-4D97-AF65-F5344CB8AC3E}">

</xml_diff>